<commit_message>
Changed Slides. Added TCP Async Server and Client
</commit_message>
<xml_diff>
--- a/AsyncStuff/AsyncDemo/Slides.pptx
+++ b/AsyncStuff/AsyncDemo/Slides.pptx
@@ -203,7 +203,7 @@
             <a:fld id="{C5F6FB3E-46EA-4718-971F-AAD1CDC94C9B}" type="datetimeFigureOut">
               <a:rPr lang="pt-PT" smtClean="0"/>
               <a:pPr/>
-              <a:t>01-05-2011</a:t>
+              <a:t>02-05-2011</a:t>
             </a:fld>
             <a:endParaRPr lang="pt-PT"/>
           </a:p>
@@ -795,7 +795,7 @@
             <a:fld id="{990166D8-BE43-416A-864B-A1544A4A96DB}" type="datetimeFigureOut">
               <a:rPr lang="pt-PT" smtClean="0"/>
               <a:pPr/>
-              <a:t>01-05-2011</a:t>
+              <a:t>02-05-2011</a:t>
             </a:fld>
             <a:endParaRPr lang="pt-PT"/>
           </a:p>
@@ -1020,7 +1020,7 @@
             <a:fld id="{990166D8-BE43-416A-864B-A1544A4A96DB}" type="datetimeFigureOut">
               <a:rPr lang="pt-PT" smtClean="0"/>
               <a:pPr/>
-              <a:t>01-05-2011</a:t>
+              <a:t>02-05-2011</a:t>
             </a:fld>
             <a:endParaRPr lang="pt-PT"/>
           </a:p>
@@ -1302,7 +1302,7 @@
             <a:fld id="{990166D8-BE43-416A-864B-A1544A4A96DB}" type="datetimeFigureOut">
               <a:rPr lang="pt-PT" smtClean="0"/>
               <a:pPr/>
-              <a:t>01-05-2011</a:t>
+              <a:t>02-05-2011</a:t>
             </a:fld>
             <a:endParaRPr lang="pt-PT"/>
           </a:p>
@@ -1483,7 +1483,7 @@
             <a:fld id="{990166D8-BE43-416A-864B-A1544A4A96DB}" type="datetimeFigureOut">
               <a:rPr lang="pt-PT" smtClean="0"/>
               <a:pPr/>
-              <a:t>01-05-2011</a:t>
+              <a:t>02-05-2011</a:t>
             </a:fld>
             <a:endParaRPr lang="pt-PT"/>
           </a:p>
@@ -1838,7 +1838,7 @@
             <a:fld id="{990166D8-BE43-416A-864B-A1544A4A96DB}" type="datetimeFigureOut">
               <a:rPr lang="pt-PT" smtClean="0"/>
               <a:pPr/>
-              <a:t>01-05-2011</a:t>
+              <a:t>02-05-2011</a:t>
             </a:fld>
             <a:endParaRPr lang="pt-PT"/>
           </a:p>
@@ -2127,7 +2127,7 @@
             <a:fld id="{990166D8-BE43-416A-864B-A1544A4A96DB}" type="datetimeFigureOut">
               <a:rPr lang="pt-PT" smtClean="0"/>
               <a:pPr/>
-              <a:t>01-05-2011</a:t>
+              <a:t>02-05-2011</a:t>
             </a:fld>
             <a:endParaRPr lang="pt-PT"/>
           </a:p>
@@ -2551,7 +2551,7 @@
             <a:fld id="{990166D8-BE43-416A-864B-A1544A4A96DB}" type="datetimeFigureOut">
               <a:rPr lang="pt-PT" smtClean="0"/>
               <a:pPr/>
-              <a:t>01-05-2011</a:t>
+              <a:t>02-05-2011</a:t>
             </a:fld>
             <a:endParaRPr lang="pt-PT"/>
           </a:p>
@@ -2668,7 +2668,7 @@
             <a:fld id="{990166D8-BE43-416A-864B-A1544A4A96DB}" type="datetimeFigureOut">
               <a:rPr lang="pt-PT" smtClean="0"/>
               <a:pPr/>
-              <a:t>01-05-2011</a:t>
+              <a:t>02-05-2011</a:t>
             </a:fld>
             <a:endParaRPr lang="pt-PT"/>
           </a:p>
@@ -2760,7 +2760,7 @@
             <a:fld id="{990166D8-BE43-416A-864B-A1544A4A96DB}" type="datetimeFigureOut">
               <a:rPr lang="pt-PT" smtClean="0"/>
               <a:pPr/>
-              <a:t>01-05-2011</a:t>
+              <a:t>02-05-2011</a:t>
             </a:fld>
             <a:endParaRPr lang="pt-PT"/>
           </a:p>
@@ -3040,7 +3040,7 @@
             <a:fld id="{990166D8-BE43-416A-864B-A1544A4A96DB}" type="datetimeFigureOut">
               <a:rPr lang="pt-PT" smtClean="0"/>
               <a:pPr/>
-              <a:t>01-05-2011</a:t>
+              <a:t>02-05-2011</a:t>
             </a:fld>
             <a:endParaRPr lang="pt-PT"/>
           </a:p>
@@ -3403,7 +3403,7 @@
             <a:fld id="{990166D8-BE43-416A-864B-A1544A4A96DB}" type="datetimeFigureOut">
               <a:rPr lang="pt-PT" smtClean="0"/>
               <a:pPr/>
-              <a:t>01-05-2011</a:t>
+              <a:t>02-05-2011</a:t>
             </a:fld>
             <a:endParaRPr lang="pt-PT"/>
           </a:p>
@@ -3842,7 +3842,7 @@
             <a:fld id="{990166D8-BE43-416A-864B-A1544A4A96DB}" type="datetimeFigureOut">
               <a:rPr lang="pt-PT" smtClean="0"/>
               <a:pPr/>
-              <a:t>01-05-2011</a:t>
+              <a:t>02-05-2011</a:t>
             </a:fld>
             <a:endParaRPr lang="pt-PT"/>
           </a:p>
@@ -4406,9 +4406,17 @@
           <a:lstStyle/>
           <a:p>
             <a:r>
+              <a:rPr lang="pt-PT" dirty="0" smtClean="0"/>
+              <a:t>“</a:t>
+            </a:r>
+            <a:r>
               <a:rPr lang="pt-PT" dirty="0" err="1" smtClean="0"/>
               <a:t>Assincronizadores</a:t>
             </a:r>
+            <a:r>
+              <a:rPr lang="pt-PT" dirty="0" smtClean="0"/>
+              <a:t>”</a:t>
+            </a:r>
             <a:endParaRPr lang="pt-PT" dirty="0"/>
           </a:p>
         </p:txBody>
@@ -4425,8 +4433,8 @@
         </p:nvSpPr>
         <p:spPr>
           <a:xfrm>
-            <a:off x="467544" y="1772816"/>
-            <a:ext cx="8229600" cy="4625609"/>
+            <a:off x="467544" y="1772817"/>
+            <a:ext cx="8229600" cy="2736304"/>
           </a:xfrm>
         </p:spPr>
         <p:txBody>
@@ -4478,11 +4486,7 @@
             </a:r>
             <a:r>
               <a:rPr lang="pt-PT" sz="2000" dirty="0" err="1" smtClean="0"/>
-              <a:t>Async</a:t>
-            </a:r>
-            <a:r>
-              <a:rPr lang="pt-PT" sz="2000" dirty="0" err="1" smtClean="0"/>
-              <a:t>CountDownLatch</a:t>
+              <a:t>AsyncCountDownLatch</a:t>
             </a:r>
             <a:r>
               <a:rPr lang="pt-PT" sz="2000" dirty="0" smtClean="0"/>
@@ -4538,6 +4542,87 @@
             </a:r>
           </a:p>
           <a:p>
+            <a:endParaRPr lang="pt-PT" dirty="0"/>
+          </a:p>
+        </p:txBody>
+      </p:sp>
+      <p:sp>
+        <p:nvSpPr>
+          <p:cNvPr id="4" name="CaixaDeTexto 3"/>
+          <p:cNvSpPr txBox="1"/>
+          <p:nvPr/>
+        </p:nvSpPr>
+        <p:spPr>
+          <a:xfrm>
+            <a:off x="971600" y="4653136"/>
+            <a:ext cx="7488832" cy="923330"/>
+          </a:xfrm>
+          <a:prstGeom prst="rect">
+            <a:avLst/>
+          </a:prstGeom>
+          <a:noFill/>
+        </p:spPr>
+        <p:txBody>
+          <a:bodyPr wrap="square" rtlCol="0">
+            <a:spAutoFit/>
+          </a:bodyPr>
+          <a:lstStyle/>
+          <a:p>
+            <a:r>
+              <a:rPr lang="pt-PT" dirty="0" err="1" smtClean="0">
+                <a:solidFill>
+                  <a:srgbClr val="0070C0"/>
+                </a:solidFill>
+              </a:rPr>
+              <a:t>await</a:t>
+            </a:r>
+            <a:r>
+              <a:rPr lang="pt-PT" dirty="0" smtClean="0"/>
+              <a:t> </a:t>
+            </a:r>
+            <a:r>
+              <a:rPr lang="pt-PT" dirty="0" err="1" smtClean="0"/>
+              <a:t>countDownLatch</a:t>
+            </a:r>
+            <a:r>
+              <a:rPr lang="pt-PT" dirty="0" smtClean="0"/>
+              <a:t> </a:t>
+            </a:r>
+            <a:r>
+              <a:rPr lang="pt-PT" dirty="0" smtClean="0"/>
+              <a:t>  				.</a:t>
+            </a:r>
+            <a:r>
+              <a:rPr lang="pt-PT" dirty="0" err="1" smtClean="0"/>
+              <a:t>WithTimeout</a:t>
+            </a:r>
+            <a:r>
+              <a:rPr lang="pt-PT" dirty="0" smtClean="0"/>
+              <a:t>(1000)</a:t>
+            </a:r>
+            <a:br>
+              <a:rPr lang="pt-PT" dirty="0" smtClean="0"/>
+            </a:br>
+            <a:r>
+              <a:rPr lang="pt-PT" dirty="0" smtClean="0"/>
+              <a:t>	.</a:t>
+            </a:r>
+            <a:r>
+              <a:rPr lang="pt-PT" dirty="0" err="1" smtClean="0"/>
+              <a:t>WithCancellation</a:t>
+            </a:r>
+            <a:r>
+              <a:rPr lang="pt-PT" dirty="0" smtClean="0"/>
+              <a:t>(</a:t>
+            </a:r>
+            <a:r>
+              <a:rPr lang="pt-PT" dirty="0" err="1" smtClean="0"/>
+              <a:t>cancellationSource.Token</a:t>
+            </a:r>
+            <a:r>
+              <a:rPr lang="pt-PT" dirty="0" smtClean="0"/>
+              <a:t>);</a:t>
+            </a:r>
             <a:endParaRPr lang="pt-PT" dirty="0"/>
           </a:p>
         </p:txBody>
@@ -4617,115 +4702,155 @@
           <a:bodyPr/>
           <a:lstStyle/>
           <a:p>
-            <a:r>
-              <a:rPr lang="pt-PT" sz="2800" dirty="0" smtClean="0"/>
-              <a:t>Demo </a:t>
-            </a:r>
-            <a:r>
-              <a:rPr lang="pt-PT" sz="2800" dirty="0" smtClean="0"/>
-              <a:t>da apresentação</a:t>
+            <a:pPr>
+              <a:lnSpc>
+                <a:spcPct val="150000"/>
+              </a:lnSpc>
+            </a:pPr>
+            <a:r>
+              <a:rPr lang="pt-PT" sz="2400" dirty="0" smtClean="0"/>
+              <a:t>Demo da apresentação</a:t>
             </a:r>
             <a:br>
-              <a:rPr lang="pt-PT" sz="2800" dirty="0" smtClean="0"/>
+              <a:rPr lang="pt-PT" sz="2400" dirty="0" smtClean="0"/>
             </a:br>
             <a:r>
-              <a:rPr lang="pt-PT" sz="2000" dirty="0" smtClean="0">
+              <a:rPr lang="pt-PT" sz="1800" dirty="0" smtClean="0">
                 <a:hlinkClick r:id="rId2"/>
               </a:rPr>
-              <a:t>https://</a:t>
-            </a:r>
-            <a:r>
-              <a:rPr lang="pt-PT" sz="2000" dirty="0" smtClean="0">
-                <a:hlinkClick r:id="rId2"/>
-              </a:rPr>
-              <a:t>github.com/DVDPT/Programmatically-Speaking-Repository/tree/master/AsyncStuff/AsyncDemo</a:t>
-            </a:r>
-            <a:endParaRPr lang="pt-PT" sz="2800" dirty="0" smtClean="0"/>
-          </a:p>
-          <a:p>
-            <a:r>
-              <a:rPr lang="pt-PT" sz="2800" dirty="0" smtClean="0"/>
+              <a:t>https://github.com/DVDPT/Programmatically-Speaking-Repository/tree/master/AsyncStuff/AsyncDemo</a:t>
+            </a:r>
+            <a:endParaRPr lang="pt-PT" sz="2400" dirty="0" smtClean="0"/>
+          </a:p>
+          <a:p>
+            <a:pPr>
+              <a:lnSpc>
+                <a:spcPct val="150000"/>
+              </a:lnSpc>
+            </a:pPr>
+            <a:r>
+              <a:rPr lang="pt-PT" sz="2400" dirty="0" smtClean="0"/>
               <a:t>101 C# </a:t>
             </a:r>
             <a:r>
-              <a:rPr lang="pt-PT" sz="2800" dirty="0" err="1" smtClean="0"/>
+              <a:rPr lang="pt-PT" sz="2400" dirty="0" err="1" smtClean="0"/>
               <a:t>Async</a:t>
             </a:r>
             <a:r>
-              <a:rPr lang="pt-PT" sz="2800" dirty="0" smtClean="0"/>
+              <a:rPr lang="pt-PT" sz="2400" dirty="0" smtClean="0"/>
               <a:t> </a:t>
             </a:r>
             <a:r>
-              <a:rPr lang="pt-PT" sz="2800" dirty="0" err="1" smtClean="0"/>
+              <a:rPr lang="pt-PT" sz="2400" dirty="0" err="1" smtClean="0"/>
               <a:t>Samples</a:t>
             </a:r>
             <a:r>
-              <a:rPr lang="pt-PT" sz="2800" dirty="0" smtClean="0"/>
+              <a:rPr lang="pt-PT" sz="2400" dirty="0" smtClean="0"/>
               <a:t> </a:t>
             </a:r>
             <a:r>
-              <a:rPr lang="pt-PT" sz="2000" dirty="0" smtClean="0">
+              <a:rPr lang="pt-PT" sz="1800" dirty="0" smtClean="0">
                 <a:hlinkClick r:id="rId3"/>
               </a:rPr>
-              <a:t>http</a:t>
-            </a:r>
-            <a:r>
-              <a:rPr lang="pt-PT" sz="2000" dirty="0" smtClean="0">
+              <a:t>http://www.wischik.com/lu/AsyncSilverlight/AsyncSamples.html</a:t>
+            </a:r>
+            <a:endParaRPr lang="pt-PT" sz="2000" dirty="0" smtClean="0"/>
+          </a:p>
+          <a:p>
+            <a:pPr>
+              <a:lnSpc>
+                <a:spcPct val="150000"/>
+              </a:lnSpc>
+            </a:pPr>
+            <a:r>
+              <a:rPr lang="pt-PT" sz="2400" dirty="0" err="1" smtClean="0"/>
+              <a:t>Parallel</a:t>
+            </a:r>
+            <a:r>
+              <a:rPr lang="pt-PT" sz="2400" dirty="0" smtClean="0"/>
+              <a:t> </a:t>
+            </a:r>
+            <a:r>
+              <a:rPr lang="pt-PT" sz="2400" dirty="0" err="1" smtClean="0"/>
+              <a:t>Programming</a:t>
+            </a:r>
+            <a:r>
+              <a:rPr lang="pt-PT" sz="2400" dirty="0" smtClean="0"/>
+              <a:t> </a:t>
+            </a:r>
+            <a:r>
+              <a:rPr lang="pt-PT" sz="2400" dirty="0" err="1" smtClean="0"/>
+              <a:t>team</a:t>
+            </a:r>
+            <a:r>
+              <a:rPr lang="pt-PT" sz="2400" dirty="0" smtClean="0"/>
+              <a:t> </a:t>
+            </a:r>
+            <a:r>
+              <a:rPr lang="pt-PT" sz="2400" dirty="0" err="1" smtClean="0"/>
+              <a:t>blog</a:t>
+            </a:r>
+            <a:r>
+              <a:rPr lang="pt-PT" sz="2400" dirty="0" smtClean="0"/>
+              <a:t/>
+            </a:r>
+            <a:br>
+              <a:rPr lang="pt-PT" sz="2400" dirty="0" smtClean="0"/>
+            </a:br>
+            <a:r>
+              <a:rPr lang="pt-PT" sz="1800" dirty="0" smtClean="0">
+                <a:hlinkClick r:id="rId4"/>
+              </a:rPr>
+              <a:t>http://blogs.msdn.com/b/pfxteam</a:t>
+            </a:r>
+            <a:r>
+              <a:rPr lang="pt-PT" sz="1800" dirty="0" smtClean="0">
+                <a:hlinkClick r:id="rId4"/>
+              </a:rPr>
+              <a:t>/</a:t>
+            </a:r>
+            <a:endParaRPr lang="pt-PT" sz="1800" dirty="0" smtClean="0"/>
+          </a:p>
+          <a:p>
+            <a:pPr>
+              <a:lnSpc>
+                <a:spcPct val="150000"/>
+              </a:lnSpc>
+            </a:pPr>
+            <a:r>
+              <a:rPr lang="pt-PT" sz="2400" dirty="0" smtClean="0"/>
+              <a:t>C# 5.0 </a:t>
+            </a:r>
+            <a:r>
+              <a:rPr lang="pt-PT" sz="2400" dirty="0" err="1" smtClean="0"/>
+              <a:t>Async</a:t>
+            </a:r>
+            <a:r>
+              <a:rPr lang="pt-PT" sz="2400" dirty="0" smtClean="0"/>
+              <a:t> </a:t>
+            </a:r>
+            <a:r>
+              <a:rPr lang="pt-PT" sz="2400" dirty="0" smtClean="0"/>
+              <a:t>CTP </a:t>
+            </a:r>
+            <a:r>
+              <a:rPr lang="pt-PT" sz="1800" dirty="0" smtClean="0">
                 <a:hlinkClick r:id="rId3"/>
               </a:rPr>
-              <a:t>://</a:t>
-            </a:r>
-            <a:r>
-              <a:rPr lang="pt-PT" sz="2000" dirty="0" smtClean="0">
+              <a:t/>
+            </a:r>
+            <a:br>
+              <a:rPr lang="pt-PT" sz="1800" dirty="0" smtClean="0">
                 <a:hlinkClick r:id="rId3"/>
               </a:rPr>
-              <a:t>www.wischik.com/lu/AsyncSilverlight/AsyncSamples.html</a:t>
-            </a:r>
-            <a:endParaRPr lang="pt-PT" sz="2400" dirty="0" smtClean="0"/>
-          </a:p>
-          <a:p>
-            <a:r>
-              <a:rPr lang="pt-PT" sz="2800" dirty="0" err="1" smtClean="0"/>
-              <a:t>Parallel</a:t>
-            </a:r>
-            <a:r>
-              <a:rPr lang="pt-PT" sz="2800" dirty="0" smtClean="0"/>
-              <a:t> </a:t>
-            </a:r>
-            <a:r>
-              <a:rPr lang="pt-PT" sz="2800" dirty="0" err="1" smtClean="0"/>
-              <a:t>Programming</a:t>
-            </a:r>
-            <a:r>
-              <a:rPr lang="pt-PT" sz="2800" dirty="0" smtClean="0"/>
-              <a:t> </a:t>
-            </a:r>
-            <a:r>
-              <a:rPr lang="pt-PT" sz="2800" dirty="0" err="1" smtClean="0"/>
-              <a:t>team</a:t>
-            </a:r>
-            <a:r>
-              <a:rPr lang="pt-PT" sz="2800" dirty="0" smtClean="0"/>
-              <a:t> </a:t>
-            </a:r>
-            <a:r>
-              <a:rPr lang="pt-PT" sz="2800" dirty="0" err="1" smtClean="0"/>
-              <a:t>blog</a:t>
-            </a:r>
-            <a:r>
-              <a:rPr lang="pt-PT" sz="2800" dirty="0" smtClean="0"/>
-              <a:t/>
-            </a:r>
-            <a:br>
-              <a:rPr lang="pt-PT" sz="2800" dirty="0" smtClean="0"/>
             </a:br>
             <a:r>
-              <a:rPr lang="pt-PT" sz="2000" dirty="0" smtClean="0">
-                <a:hlinkClick r:id="rId4"/>
+              <a:rPr lang="pt-PT" sz="1800" dirty="0" smtClean="0">
+                <a:hlinkClick r:id="rId3"/>
               </a:rPr>
-              <a:t>http://blogs.msdn.com/b/pfxteam/</a:t>
-            </a:r>
-            <a:endParaRPr lang="pt-PT" sz="2000" dirty="0" smtClean="0">
+              <a:t>http://msdn.microsoft.com/en-us/vstudio/gg316360</a:t>
+            </a:r>
+            <a:endParaRPr lang="pt-PT" sz="1800" dirty="0" smtClean="0">
               <a:hlinkClick r:id="rId3"/>
             </a:endParaRPr>
           </a:p>
@@ -4751,7 +4876,7 @@
         </p:blipFill>
         <p:spPr bwMode="auto">
           <a:xfrm>
-            <a:off x="3563888" y="4581128"/>
+            <a:off x="7092280" y="4941168"/>
             <a:ext cx="1872208" cy="1872208"/>
           </a:xfrm>
           <a:prstGeom prst="rect">
@@ -4843,11 +4968,7 @@
             </a:pPr>
             <a:r>
               <a:rPr lang="pt-PT" dirty="0" smtClean="0"/>
-              <a:t>Motivação</a:t>
-            </a:r>
-            <a:r>
-              <a:rPr lang="pt-PT" dirty="0" smtClean="0"/>
-              <a:t>.</a:t>
+              <a:t>Motivação.</a:t>
             </a:r>
           </a:p>
           <a:p>
@@ -5216,7 +5337,19 @@
             </a:r>
             <a:r>
               <a:rPr lang="pt-PT" dirty="0" smtClean="0"/>
-              <a:t>utilizada para “decorar” métodos assíncronos.                         </a:t>
+              <a:t>utilizada para </a:t>
+            </a:r>
+            <a:r>
+              <a:rPr lang="pt-PT" dirty="0" smtClean="0"/>
+              <a:t>declarar métodos </a:t>
+            </a:r>
+            <a:r>
+              <a:rPr lang="pt-PT" dirty="0" smtClean="0"/>
+              <a:t>assíncronos.                         </a:t>
+            </a:r>
+            <a:r>
+              <a:rPr lang="pt-PT" dirty="0" smtClean="0"/>
+              <a:t>            </a:t>
             </a:r>
             <a:r>
               <a:rPr lang="pt-PT" b="1" dirty="0" err="1" smtClean="0"/>
@@ -5300,22 +5433,26 @@
               <a:t> </a:t>
             </a:r>
             <a:r>
-              <a:rPr lang="pt-PT" sz="2000" b="1" dirty="0" err="1" smtClean="0"/>
+              <a:rPr lang="pt-PT" sz="2000" dirty="0" err="1" smtClean="0">
+                <a:solidFill>
+                  <a:srgbClr val="0070C0"/>
+                </a:solidFill>
+              </a:rPr>
               <a:t>await</a:t>
             </a:r>
             <a:r>
-              <a:rPr lang="pt-PT" sz="2000" b="1" dirty="0" smtClean="0"/>
+              <a:rPr lang="pt-PT" sz="2000" dirty="0" smtClean="0"/>
               <a:t> </a:t>
             </a:r>
             <a:r>
-              <a:rPr lang="pt-PT" sz="2000" b="1" dirty="0" err="1" smtClean="0"/>
+              <a:rPr lang="pt-PT" sz="2000" dirty="0" err="1" smtClean="0"/>
               <a:t>SomeMethodAsync</a:t>
             </a:r>
             <a:r>
-              <a:rPr lang="pt-PT" sz="2000" b="1" dirty="0" smtClean="0"/>
+              <a:rPr lang="pt-PT" sz="2000" dirty="0" smtClean="0"/>
               <a:t>()</a:t>
             </a:r>
-            <a:endParaRPr lang="pt-PT" b="1" dirty="0" smtClean="0"/>
+            <a:endParaRPr lang="pt-PT" dirty="0" smtClean="0"/>
           </a:p>
           <a:p>
             <a:endParaRPr lang="pt-PT" b="1" dirty="0"/>
@@ -6170,7 +6307,15 @@
             </a:r>
             <a:r>
               <a:rPr lang="pt-PT" sz="1400" dirty="0" smtClean="0"/>
-              <a:t> ASYNC_OPERATION_COMPLTED;</a:t>
+              <a:t> </a:t>
+            </a:r>
+            <a:r>
+              <a:rPr lang="pt-PT" sz="1400" dirty="0" smtClean="0"/>
+              <a:t>ASYNC_OPERATION_COMPLETED</a:t>
+            </a:r>
+            <a:r>
+              <a:rPr lang="pt-PT" sz="1400" dirty="0" smtClean="0"/>
+              <a:t>;</a:t>
             </a:r>
           </a:p>
           <a:p>
@@ -6295,7 +6440,11 @@
           <a:p>
             <a:r>
               <a:rPr lang="pt-PT" sz="1400" dirty="0" smtClean="0"/>
-              <a:t>ASYNC_OPERATIONS_COMPLTED:</a:t>
+              <a:t>ASYNC_OPERATIONS_COMPLETED</a:t>
+            </a:r>
+            <a:r>
+              <a:rPr lang="pt-PT" sz="1400" dirty="0" smtClean="0"/>
+              <a:t>:</a:t>
             </a:r>
           </a:p>
           <a:p>
@@ -6431,17 +6580,437 @@
           </a:p>
         </p:txBody>
       </p:sp>
+      <p:sp>
+        <p:nvSpPr>
+          <p:cNvPr id="13" name="Seta para a direita 12"/>
+          <p:cNvSpPr/>
+          <p:nvPr/>
+        </p:nvSpPr>
+        <p:spPr>
+          <a:xfrm rot="19262307">
+            <a:off x="3227821" y="3579294"/>
+            <a:ext cx="1230333" cy="296237"/>
+          </a:xfrm>
+          <a:prstGeom prst="rightArrow">
+            <a:avLst/>
+          </a:prstGeom>
+        </p:spPr>
+        <p:style>
+          <a:lnRef idx="2">
+            <a:schemeClr val="accent1">
+              <a:shade val="50000"/>
+            </a:schemeClr>
+          </a:lnRef>
+          <a:fillRef idx="1">
+            <a:schemeClr val="accent1"/>
+          </a:fillRef>
+          <a:effectRef idx="0">
+            <a:schemeClr val="accent1"/>
+          </a:effectRef>
+          <a:fontRef idx="minor">
+            <a:schemeClr val="lt1"/>
+          </a:fontRef>
+        </p:style>
+        <p:txBody>
+          <a:bodyPr rtlCol="0" anchor="ctr"/>
+          <a:lstStyle/>
+          <a:p>
+            <a:pPr algn="ctr"/>
+            <a:endParaRPr lang="pt-PT"/>
+          </a:p>
+        </p:txBody>
+      </p:sp>
+      <p:sp>
+        <p:nvSpPr>
+          <p:cNvPr id="14" name="CaixaDeTexto 13"/>
+          <p:cNvSpPr txBox="1"/>
+          <p:nvPr/>
+        </p:nvSpPr>
+        <p:spPr>
+          <a:xfrm rot="19218955">
+            <a:off x="-467551" y="4448135"/>
+            <a:ext cx="5479971" cy="369332"/>
+          </a:xfrm>
+          <a:prstGeom prst="rect">
+            <a:avLst/>
+          </a:prstGeom>
+          <a:noFill/>
+        </p:spPr>
+        <p:txBody>
+          <a:bodyPr wrap="square" rtlCol="0">
+            <a:spAutoFit/>
+          </a:bodyPr>
+          <a:lstStyle/>
+          <a:p>
+            <a:r>
+              <a:rPr lang="pt-PT" dirty="0" smtClean="0"/>
+              <a:t>Antes da chamada à operação assíncrona </a:t>
+            </a:r>
+            <a:endParaRPr lang="pt-PT" dirty="0"/>
+          </a:p>
+        </p:txBody>
+      </p:sp>
+      <p:sp>
+        <p:nvSpPr>
+          <p:cNvPr id="19" name="Seta para a direita 18"/>
+          <p:cNvSpPr/>
+          <p:nvPr/>
+        </p:nvSpPr>
+        <p:spPr>
+          <a:xfrm rot="1045982">
+            <a:off x="2203754" y="5606330"/>
+            <a:ext cx="1230333" cy="296237"/>
+          </a:xfrm>
+          <a:prstGeom prst="rightArrow">
+            <a:avLst/>
+          </a:prstGeom>
+        </p:spPr>
+        <p:style>
+          <a:lnRef idx="2">
+            <a:schemeClr val="accent1">
+              <a:shade val="50000"/>
+            </a:schemeClr>
+          </a:lnRef>
+          <a:fillRef idx="1">
+            <a:schemeClr val="accent1"/>
+          </a:fillRef>
+          <a:effectRef idx="0">
+            <a:schemeClr val="accent1"/>
+          </a:effectRef>
+          <a:fontRef idx="minor">
+            <a:schemeClr val="lt1"/>
+          </a:fontRef>
+        </p:style>
+        <p:txBody>
+          <a:bodyPr rtlCol="0" anchor="ctr"/>
+          <a:lstStyle/>
+          <a:p>
+            <a:pPr algn="ctr"/>
+            <a:endParaRPr lang="pt-PT"/>
+          </a:p>
+        </p:txBody>
+      </p:sp>
+      <p:sp>
+        <p:nvSpPr>
+          <p:cNvPr id="20" name="CaixaDeTexto 19"/>
+          <p:cNvSpPr txBox="1"/>
+          <p:nvPr/>
+        </p:nvSpPr>
+        <p:spPr>
+          <a:xfrm>
+            <a:off x="0" y="5229200"/>
+            <a:ext cx="3744416" cy="369332"/>
+          </a:xfrm>
+          <a:prstGeom prst="rect">
+            <a:avLst/>
+          </a:prstGeom>
+          <a:noFill/>
+        </p:spPr>
+        <p:txBody>
+          <a:bodyPr wrap="square" rtlCol="0">
+            <a:spAutoFit/>
+          </a:bodyPr>
+          <a:lstStyle/>
+          <a:p>
+            <a:r>
+              <a:rPr lang="pt-PT" dirty="0" smtClean="0"/>
+              <a:t>Após a operação assíncrona </a:t>
+            </a:r>
+            <a:endParaRPr lang="pt-PT" dirty="0"/>
+          </a:p>
+        </p:txBody>
+      </p:sp>
     </p:spTree>
   </p:cSld>
   <p:clrMapOvr>
     <a:masterClrMapping/>
   </p:clrMapOvr>
+  <p:transition>
+    <p:fade/>
+  </p:transition>
   <p:timing>
     <p:tnLst>
       <p:par>
-        <p:cTn id="1" dur="indefinite" restart="never" nodeType="tmRoot"/>
+        <p:cTn id="1" dur="indefinite" restart="never" nodeType="tmRoot">
+          <p:childTnLst>
+            <p:seq concurrent="1" nextAc="seek">
+              <p:cTn id="2" dur="indefinite" nodeType="mainSeq">
+                <p:childTnLst>
+                  <p:par>
+                    <p:cTn id="3" fill="hold">
+                      <p:stCondLst>
+                        <p:cond delay="indefinite"/>
+                      </p:stCondLst>
+                      <p:childTnLst>
+                        <p:par>
+                          <p:cTn id="4" fill="hold">
+                            <p:stCondLst>
+                              <p:cond delay="0"/>
+                            </p:stCondLst>
+                            <p:childTnLst>
+                              <p:par>
+                                <p:cTn id="5" presetID="4" presetClass="entr" presetSubtype="16" fill="hold" grpId="0" nodeType="clickEffect">
+                                  <p:stCondLst>
+                                    <p:cond delay="0"/>
+                                  </p:stCondLst>
+                                  <p:childTnLst>
+                                    <p:set>
+                                      <p:cBhvr>
+                                        <p:cTn id="6" dur="1" fill="hold">
+                                          <p:stCondLst>
+                                            <p:cond delay="0"/>
+                                          </p:stCondLst>
+                                        </p:cTn>
+                                        <p:tgtEl>
+                                          <p:spTgt spid="13"/>
+                                        </p:tgtEl>
+                                        <p:attrNameLst>
+                                          <p:attrName>style.visibility</p:attrName>
+                                        </p:attrNameLst>
+                                      </p:cBhvr>
+                                      <p:to>
+                                        <p:strVal val="visible"/>
+                                      </p:to>
+                                    </p:set>
+                                    <p:animEffect transition="in" filter="box(in)">
+                                      <p:cBhvr>
+                                        <p:cTn id="7" dur="500"/>
+                                        <p:tgtEl>
+                                          <p:spTgt spid="13"/>
+                                        </p:tgtEl>
+                                      </p:cBhvr>
+                                    </p:animEffect>
+                                  </p:childTnLst>
+                                </p:cTn>
+                              </p:par>
+                              <p:par>
+                                <p:cTn id="8" presetID="4" presetClass="entr" presetSubtype="16" fill="hold" grpId="0" nodeType="withEffect">
+                                  <p:stCondLst>
+                                    <p:cond delay="0"/>
+                                  </p:stCondLst>
+                                  <p:childTnLst>
+                                    <p:set>
+                                      <p:cBhvr>
+                                        <p:cTn id="9" dur="1" fill="hold">
+                                          <p:stCondLst>
+                                            <p:cond delay="0"/>
+                                          </p:stCondLst>
+                                        </p:cTn>
+                                        <p:tgtEl>
+                                          <p:spTgt spid="14"/>
+                                        </p:tgtEl>
+                                        <p:attrNameLst>
+                                          <p:attrName>style.visibility</p:attrName>
+                                        </p:attrNameLst>
+                                      </p:cBhvr>
+                                      <p:to>
+                                        <p:strVal val="visible"/>
+                                      </p:to>
+                                    </p:set>
+                                    <p:animEffect transition="in" filter="box(in)">
+                                      <p:cBhvr>
+                                        <p:cTn id="10" dur="500"/>
+                                        <p:tgtEl>
+                                          <p:spTgt spid="14"/>
+                                        </p:tgtEl>
+                                      </p:cBhvr>
+                                    </p:animEffect>
+                                  </p:childTnLst>
+                                </p:cTn>
+                              </p:par>
+                            </p:childTnLst>
+                          </p:cTn>
+                        </p:par>
+                      </p:childTnLst>
+                    </p:cTn>
+                  </p:par>
+                  <p:par>
+                    <p:cTn id="11" fill="hold">
+                      <p:stCondLst>
+                        <p:cond delay="indefinite"/>
+                      </p:stCondLst>
+                      <p:childTnLst>
+                        <p:par>
+                          <p:cTn id="12" fill="hold">
+                            <p:stCondLst>
+                              <p:cond delay="0"/>
+                            </p:stCondLst>
+                            <p:childTnLst>
+                              <p:par>
+                                <p:cTn id="13" presetID="4" presetClass="exit" presetSubtype="16" fill="hold" grpId="1" nodeType="clickEffect">
+                                  <p:stCondLst>
+                                    <p:cond delay="0"/>
+                                  </p:stCondLst>
+                                  <p:childTnLst>
+                                    <p:animEffect transition="out" filter="box(in)">
+                                      <p:cBhvr>
+                                        <p:cTn id="14" dur="500"/>
+                                        <p:tgtEl>
+                                          <p:spTgt spid="13"/>
+                                        </p:tgtEl>
+                                      </p:cBhvr>
+                                    </p:animEffect>
+                                    <p:set>
+                                      <p:cBhvr>
+                                        <p:cTn id="15" dur="1" fill="hold">
+                                          <p:stCondLst>
+                                            <p:cond delay="499"/>
+                                          </p:stCondLst>
+                                        </p:cTn>
+                                        <p:tgtEl>
+                                          <p:spTgt spid="13"/>
+                                        </p:tgtEl>
+                                        <p:attrNameLst>
+                                          <p:attrName>style.visibility</p:attrName>
+                                        </p:attrNameLst>
+                                      </p:cBhvr>
+                                      <p:to>
+                                        <p:strVal val="hidden"/>
+                                      </p:to>
+                                    </p:set>
+                                  </p:childTnLst>
+                                </p:cTn>
+                              </p:par>
+                              <p:par>
+                                <p:cTn id="16" presetID="4" presetClass="exit" presetSubtype="16" fill="hold" grpId="1" nodeType="withEffect">
+                                  <p:stCondLst>
+                                    <p:cond delay="0"/>
+                                  </p:stCondLst>
+                                  <p:childTnLst>
+                                    <p:animEffect transition="out" filter="box(in)">
+                                      <p:cBhvr>
+                                        <p:cTn id="17" dur="500"/>
+                                        <p:tgtEl>
+                                          <p:spTgt spid="14"/>
+                                        </p:tgtEl>
+                                      </p:cBhvr>
+                                    </p:animEffect>
+                                    <p:set>
+                                      <p:cBhvr>
+                                        <p:cTn id="18" dur="1" fill="hold">
+                                          <p:stCondLst>
+                                            <p:cond delay="499"/>
+                                          </p:stCondLst>
+                                        </p:cTn>
+                                        <p:tgtEl>
+                                          <p:spTgt spid="14"/>
+                                        </p:tgtEl>
+                                        <p:attrNameLst>
+                                          <p:attrName>style.visibility</p:attrName>
+                                        </p:attrNameLst>
+                                      </p:cBhvr>
+                                      <p:to>
+                                        <p:strVal val="hidden"/>
+                                      </p:to>
+                                    </p:set>
+                                  </p:childTnLst>
+                                </p:cTn>
+                              </p:par>
+                              <p:par>
+                                <p:cTn id="19" presetID="4" presetClass="entr" presetSubtype="16" fill="hold" grpId="0" nodeType="withEffect">
+                                  <p:stCondLst>
+                                    <p:cond delay="0"/>
+                                  </p:stCondLst>
+                                  <p:childTnLst>
+                                    <p:set>
+                                      <p:cBhvr>
+                                        <p:cTn id="20" dur="1" fill="hold">
+                                          <p:stCondLst>
+                                            <p:cond delay="0"/>
+                                          </p:stCondLst>
+                                        </p:cTn>
+                                        <p:tgtEl>
+                                          <p:spTgt spid="19"/>
+                                        </p:tgtEl>
+                                        <p:attrNameLst>
+                                          <p:attrName>style.visibility</p:attrName>
+                                        </p:attrNameLst>
+                                      </p:cBhvr>
+                                      <p:to>
+                                        <p:strVal val="visible"/>
+                                      </p:to>
+                                    </p:set>
+                                    <p:animEffect transition="in" filter="box(in)">
+                                      <p:cBhvr>
+                                        <p:cTn id="21" dur="500"/>
+                                        <p:tgtEl>
+                                          <p:spTgt spid="19"/>
+                                        </p:tgtEl>
+                                      </p:cBhvr>
+                                    </p:animEffect>
+                                  </p:childTnLst>
+                                </p:cTn>
+                              </p:par>
+                              <p:par>
+                                <p:cTn id="22" presetID="4" presetClass="entr" presetSubtype="16" fill="hold" grpId="0" nodeType="withEffect">
+                                  <p:stCondLst>
+                                    <p:cond delay="0"/>
+                                  </p:stCondLst>
+                                  <p:childTnLst>
+                                    <p:set>
+                                      <p:cBhvr>
+                                        <p:cTn id="23" dur="1" fill="hold">
+                                          <p:stCondLst>
+                                            <p:cond delay="0"/>
+                                          </p:stCondLst>
+                                        </p:cTn>
+                                        <p:tgtEl>
+                                          <p:spTgt spid="20"/>
+                                        </p:tgtEl>
+                                        <p:attrNameLst>
+                                          <p:attrName>style.visibility</p:attrName>
+                                        </p:attrNameLst>
+                                      </p:cBhvr>
+                                      <p:to>
+                                        <p:strVal val="visible"/>
+                                      </p:to>
+                                    </p:set>
+                                    <p:animEffect transition="in" filter="box(in)">
+                                      <p:cBhvr>
+                                        <p:cTn id="24" dur="500"/>
+                                        <p:tgtEl>
+                                          <p:spTgt spid="20"/>
+                                        </p:tgtEl>
+                                      </p:cBhvr>
+                                    </p:animEffect>
+                                  </p:childTnLst>
+                                </p:cTn>
+                              </p:par>
+                            </p:childTnLst>
+                          </p:cTn>
+                        </p:par>
+                      </p:childTnLst>
+                    </p:cTn>
+                  </p:par>
+                </p:childTnLst>
+              </p:cTn>
+              <p:prevCondLst>
+                <p:cond evt="onPrev" delay="0">
+                  <p:tgtEl>
+                    <p:sldTgt/>
+                  </p:tgtEl>
+                </p:cond>
+              </p:prevCondLst>
+              <p:nextCondLst>
+                <p:cond evt="onNext" delay="0">
+                  <p:tgtEl>
+                    <p:sldTgt/>
+                  </p:tgtEl>
+                </p:cond>
+              </p:nextCondLst>
+            </p:seq>
+          </p:childTnLst>
+        </p:cTn>
       </p:par>
     </p:tnLst>
+    <p:bldLst>
+      <p:bldP spid="13" grpId="0" animBg="1"/>
+      <p:bldP spid="13" grpId="1" animBg="1"/>
+      <p:bldP spid="14" grpId="0"/>
+      <p:bldP spid="14" grpId="1"/>
+      <p:bldP spid="19" grpId="0" animBg="1"/>
+      <p:bldP spid="20" grpId="0"/>
+    </p:bldLst>
   </p:timing>
 </p:sld>
 </file>
@@ -6479,10 +7048,10 @@
           <a:lstStyle/>
           <a:p>
             <a:r>
-              <a:rPr lang="pt-PT" smtClean="0"/>
-              <a:t>Caracteristicas</a:t>
-            </a:r>
-            <a:endParaRPr lang="pt-PT"/>
+              <a:rPr lang="pt-PT" dirty="0" smtClean="0"/>
+              <a:t>Características</a:t>
+            </a:r>
+            <a:endParaRPr lang="pt-PT" dirty="0"/>
           </a:p>
         </p:txBody>
       </p:sp>
@@ -6573,15 +7142,7 @@
             </a:pPr>
             <a:r>
               <a:rPr lang="pt-PT" dirty="0" smtClean="0"/>
-              <a:t>Escrita </a:t>
-            </a:r>
-            <a:r>
-              <a:rPr lang="pt-PT" dirty="0" smtClean="0"/>
-              <a:t>de código síncrono, execução assíncrona</a:t>
-            </a:r>
-            <a:r>
-              <a:rPr lang="pt-PT" dirty="0" smtClean="0"/>
-              <a:t>.</a:t>
+              <a:t>Escrita de código síncrono, execução assíncrona.</a:t>
             </a:r>
           </a:p>
           <a:p>
@@ -6592,8 +7153,9 @@
             </a:pPr>
             <a:r>
               <a:rPr lang="pt-PT" dirty="0" smtClean="0"/>
-              <a:t>Uma operação assíncrona não implica sempre “a criação de uma nova thread”.</a:t>
-            </a:r>
+              <a:t>Não existe espera pela conclusão de uma operação assíncrona.</a:t>
+            </a:r>
+            <a:endParaRPr lang="pt-PT" dirty="0" smtClean="0"/>
           </a:p>
           <a:p>
             <a:endParaRPr lang="pt-PT" i="1" dirty="0" smtClean="0"/>
@@ -6723,7 +7285,6 @@
               <a:rPr lang="en-US" sz="1800" dirty="0" smtClean="0"/>
               <a:t> { get; } </a:t>
             </a:r>
-            <a:endParaRPr lang="en-US" sz="1800" dirty="0" smtClean="0"/>
           </a:p>
           <a:p>
             <a:pPr lvl="1"/>
@@ -6737,11 +7298,7 @@
             </a:r>
             <a:r>
               <a:rPr lang="en-US" sz="1800" dirty="0" smtClean="0"/>
-              <a:t>(Action</a:t>
-            </a:r>
-            <a:r>
-              <a:rPr lang="en-US" sz="1800" dirty="0" smtClean="0"/>
-              <a:t>);</a:t>
+              <a:t>(Action);</a:t>
             </a:r>
           </a:p>
           <a:p>
@@ -6813,11 +7370,15 @@
             <a:pPr lvl="1"/>
             <a:r>
               <a:rPr lang="pt-PT" sz="1800" dirty="0" err="1" smtClean="0"/>
-              <a:t>Void</a:t>
+              <a:t>void</a:t>
             </a:r>
             <a:r>
               <a:rPr lang="pt-PT" sz="1800" dirty="0" smtClean="0"/>
-              <a:t> – </a:t>
+              <a:t> </a:t>
+            </a:r>
+            <a:r>
+              <a:rPr lang="pt-PT" sz="1800" dirty="0" smtClean="0"/>
+              <a:t>– </a:t>
             </a:r>
             <a:r>
               <a:rPr lang="pt-PT" sz="1800" dirty="0" err="1" smtClean="0"/>
@@ -6855,8 +7416,12 @@
           <a:p>
             <a:pPr lvl="1"/>
             <a:r>
+              <a:rPr lang="pt-PT" sz="1800" dirty="0" err="1" smtClean="0"/>
+              <a:t>Task&lt;T</a:t>
+            </a:r>
+            <a:r>
               <a:rPr lang="pt-PT" sz="1800" dirty="0" smtClean="0"/>
-              <a:t>T</a:t>
+              <a:t>&gt;</a:t>
             </a:r>
             <a:endParaRPr lang="pt-PT" sz="1800" dirty="0" smtClean="0"/>
           </a:p>

</xml_diff>